<commit_message>
feat(custom services): improve slides
</commit_message>
<xml_diff>
--- a/15 Custom services/Custom services.pptx
+++ b/15 Custom services/Custom services.pptx
@@ -5,10 +5,10 @@
     <p:sldMasterId id="2147483648" r:id="rId1"/>
   </p:sldMasterIdLst>
   <p:notesMasterIdLst>
-    <p:notesMasterId r:id="rId18"/>
+    <p:notesMasterId r:id="rId19"/>
   </p:notesMasterIdLst>
   <p:handoutMasterIdLst>
-    <p:handoutMasterId r:id="rId19"/>
+    <p:handoutMasterId r:id="rId20"/>
   </p:handoutMasterIdLst>
   <p:sldIdLst>
     <p:sldId id="522" r:id="rId2"/>
@@ -26,7 +26,8 @@
     <p:sldId id="532" r:id="rId14"/>
     <p:sldId id="533" r:id="rId15"/>
     <p:sldId id="516" r:id="rId16"/>
-    <p:sldId id="534" r:id="rId17"/>
+    <p:sldId id="535" r:id="rId17"/>
+    <p:sldId id="534" r:id="rId18"/>
   </p:sldIdLst>
   <p:sldSz cx="9144000" cy="6858000" type="screen4x3"/>
   <p:notesSz cx="7104063" cy="10234613"/>
@@ -297,7 +298,7 @@
             <a:fld id="{87731427-D242-475D-9180-8940013A50B8}" type="datetimeFigureOut">
               <a:rPr lang="en-GB" smtClean="0"/>
               <a:pPr algn="l"/>
-              <a:t>03/04/2017</a:t>
+              <a:t>23/08/2017</a:t>
             </a:fld>
             <a:endParaRPr lang="en-GB" dirty="0"/>
           </a:p>
@@ -502,7 +503,7 @@
             <a:fld id="{BA521D56-F1F4-41A0-82EB-989F4F6F400D}" type="datetimeFigureOut">
               <a:rPr lang="fr-FR" smtClean="0"/>
               <a:pPr/>
-              <a:t>03/04/2017</a:t>
+              <a:t>23/08/2017</a:t>
             </a:fld>
             <a:endParaRPr lang="fr-FR"/>
           </a:p>
@@ -1030,7 +1031,7 @@
             <a:fld id="{973B10A7-8A2B-4F39-8160-83B51E5E9C07}" type="datetime1">
               <a:rPr lang="fr-FR" smtClean="0"/>
               <a:pPr/>
-              <a:t>03/04/2017</a:t>
+              <a:t>23/08/2017</a:t>
             </a:fld>
             <a:endParaRPr lang="fr-FR"/>
           </a:p>
@@ -1166,7 +1167,7 @@
             <a:fld id="{973B10A7-8A2B-4F39-8160-83B51E5E9C07}" type="datetime1">
               <a:rPr lang="fr-FR" smtClean="0"/>
               <a:pPr/>
-              <a:t>03/04/2017</a:t>
+              <a:t>23/08/2017</a:t>
             </a:fld>
             <a:endParaRPr lang="fr-FR"/>
           </a:p>
@@ -1302,7 +1303,7 @@
             <a:fld id="{973B10A7-8A2B-4F39-8160-83B51E5E9C07}" type="datetime1">
               <a:rPr lang="fr-FR" smtClean="0"/>
               <a:pPr/>
-              <a:t>03/04/2017</a:t>
+              <a:t>23/08/2017</a:t>
             </a:fld>
             <a:endParaRPr lang="fr-FR"/>
           </a:p>
@@ -1438,7 +1439,7 @@
             <a:fld id="{973B10A7-8A2B-4F39-8160-83B51E5E9C07}" type="datetime1">
               <a:rPr lang="fr-FR" smtClean="0"/>
               <a:pPr/>
-              <a:t>03/04/2017</a:t>
+              <a:t>23/08/2017</a:t>
             </a:fld>
             <a:endParaRPr lang="fr-FR"/>
           </a:p>
@@ -1574,7 +1575,7 @@
             <a:fld id="{973B10A7-8A2B-4F39-8160-83B51E5E9C07}" type="datetime1">
               <a:rPr lang="fr-FR" smtClean="0"/>
               <a:pPr/>
-              <a:t>03/04/2017</a:t>
+              <a:t>23/08/2017</a:t>
             </a:fld>
             <a:endParaRPr lang="fr-FR"/>
           </a:p>
@@ -1686,7 +1687,7 @@
             <a:fld id="{305287CA-3E72-4A91-B59B-B69F40801570}" type="slidenum">
               <a:rPr lang="en-GB" sz="1100" smtClean="0"/>
               <a:pPr/>
-              <a:t>16</a:t>
+              <a:t>17</a:t>
             </a:fld>
             <a:endParaRPr lang="en-GB" sz="1100" dirty="0"/>
           </a:p>
@@ -1710,7 +1711,7 @@
             <a:fld id="{973B10A7-8A2B-4F39-8160-83B51E5E9C07}" type="datetime1">
               <a:rPr lang="fr-FR" smtClean="0"/>
               <a:pPr/>
-              <a:t>03/04/2017</a:t>
+              <a:t>23/08/2017</a:t>
             </a:fld>
             <a:endParaRPr lang="fr-FR"/>
           </a:p>
@@ -1846,7 +1847,7 @@
             <a:fld id="{973B10A7-8A2B-4F39-8160-83B51E5E9C07}" type="datetime1">
               <a:rPr lang="fr-FR" smtClean="0"/>
               <a:pPr/>
-              <a:t>03/04/2017</a:t>
+              <a:t>23/08/2017</a:t>
             </a:fld>
             <a:endParaRPr lang="fr-FR"/>
           </a:p>
@@ -1982,7 +1983,7 @@
             <a:fld id="{973B10A7-8A2B-4F39-8160-83B51E5E9C07}" type="datetime1">
               <a:rPr lang="fr-FR" smtClean="0"/>
               <a:pPr/>
-              <a:t>03/04/2017</a:t>
+              <a:t>23/08/2017</a:t>
             </a:fld>
             <a:endParaRPr lang="fr-FR"/>
           </a:p>
@@ -2118,7 +2119,7 @@
             <a:fld id="{973B10A7-8A2B-4F39-8160-83B51E5E9C07}" type="datetime1">
               <a:rPr lang="fr-FR" smtClean="0"/>
               <a:pPr/>
-              <a:t>03/04/2017</a:t>
+              <a:t>23/08/2017</a:t>
             </a:fld>
             <a:endParaRPr lang="fr-FR"/>
           </a:p>
@@ -2254,7 +2255,7 @@
             <a:fld id="{973B10A7-8A2B-4F39-8160-83B51E5E9C07}" type="datetime1">
               <a:rPr lang="fr-FR" smtClean="0"/>
               <a:pPr/>
-              <a:t>03/04/2017</a:t>
+              <a:t>23/08/2017</a:t>
             </a:fld>
             <a:endParaRPr lang="fr-FR"/>
           </a:p>
@@ -2390,7 +2391,7 @@
             <a:fld id="{973B10A7-8A2B-4F39-8160-83B51E5E9C07}" type="datetime1">
               <a:rPr lang="fr-FR" smtClean="0"/>
               <a:pPr/>
-              <a:t>03/04/2017</a:t>
+              <a:t>23/08/2017</a:t>
             </a:fld>
             <a:endParaRPr lang="fr-FR"/>
           </a:p>
@@ -2526,7 +2527,7 @@
             <a:fld id="{973B10A7-8A2B-4F39-8160-83B51E5E9C07}" type="datetime1">
               <a:rPr lang="fr-FR" smtClean="0"/>
               <a:pPr/>
-              <a:t>03/04/2017</a:t>
+              <a:t>23/08/2017</a:t>
             </a:fld>
             <a:endParaRPr lang="fr-FR"/>
           </a:p>
@@ -2662,7 +2663,7 @@
             <a:fld id="{973B10A7-8A2B-4F39-8160-83B51E5E9C07}" type="datetime1">
               <a:rPr lang="fr-FR" smtClean="0"/>
               <a:pPr/>
-              <a:t>03/04/2017</a:t>
+              <a:t>23/08/2017</a:t>
             </a:fld>
             <a:endParaRPr lang="fr-FR"/>
           </a:p>
@@ -2798,7 +2799,7 @@
             <a:fld id="{973B10A7-8A2B-4F39-8160-83B51E5E9C07}" type="datetime1">
               <a:rPr lang="fr-FR" smtClean="0"/>
               <a:pPr/>
-              <a:t>03/04/2017</a:t>
+              <a:t>23/08/2017</a:t>
             </a:fld>
             <a:endParaRPr lang="fr-FR"/>
           </a:p>
@@ -11720,7 +11721,11 @@
           <a:p>
             <a:r>
               <a:rPr lang="en-GB" cap="none" dirty="0" smtClean="0"/>
-              <a:t>“The classic”</a:t>
+              <a:t>“The </a:t>
+            </a:r>
+            <a:r>
+              <a:rPr lang="en-GB" cap="none" dirty="0" smtClean="0"/>
+              <a:t>new kid in town”</a:t>
             </a:r>
             <a:endParaRPr lang="en-GB" cap="none" dirty="0"/>
           </a:p>
@@ -12127,8 +12132,8 @@
           <a:lstStyle/>
           <a:p>
             <a:r>
-              <a:rPr lang="fr-FR" cap="none" dirty="0" err="1" smtClean="0"/>
-              <a:t>Factory</a:t>
+              <a:rPr lang="fr-FR" cap="none" dirty="0" smtClean="0"/>
+              <a:t>Service</a:t>
             </a:r>
             <a:endParaRPr lang="en-GB" cap="none" dirty="0"/>
           </a:p>
@@ -14787,6 +14792,176 @@
             <p:ph idx="1"/>
           </p:nvPr>
         </p:nvSpPr>
+        <p:spPr/>
+        <p:txBody>
+          <a:bodyPr/>
+          <a:lstStyle/>
+          <a:p>
+            <a:endParaRPr lang="fr-FR" dirty="0" smtClean="0"/>
+          </a:p>
+          <a:p>
+            <a:endParaRPr lang="fr-FR" dirty="0"/>
+          </a:p>
+          <a:p>
+            <a:endParaRPr lang="fr-FR" dirty="0" smtClean="0"/>
+          </a:p>
+          <a:p>
+            <a:endParaRPr lang="fr-FR" dirty="0"/>
+          </a:p>
+          <a:p>
+            <a:endParaRPr lang="fr-FR" dirty="0" smtClean="0"/>
+          </a:p>
+          <a:p>
+            <a:endParaRPr lang="fr-FR" dirty="0"/>
+          </a:p>
+          <a:p>
+            <a:pPr marL="0" indent="0" algn="ctr">
+              <a:buNone/>
+            </a:pPr>
+            <a:endParaRPr lang="fr-FR" sz="4400" dirty="0" smtClean="0"/>
+          </a:p>
+          <a:p>
+            <a:pPr marL="0" indent="0" algn="ctr">
+              <a:buNone/>
+            </a:pPr>
+            <a:r>
+              <a:rPr lang="fr-FR" sz="6600" b="1" dirty="0" smtClean="0"/>
+              <a:t>Use </a:t>
+            </a:r>
+            <a:r>
+              <a:rPr lang="fr-FR" sz="6600" b="1" dirty="0" smtClean="0">
+                <a:latin typeface="Consolas" panose="020B0609020204030204" pitchFamily="49" charset="0"/>
+              </a:rPr>
+              <a:t>service()</a:t>
+            </a:r>
+            <a:endParaRPr lang="fr-FR" sz="6600" b="1" dirty="0"/>
+          </a:p>
+        </p:txBody>
+      </p:sp>
+      <p:sp>
+        <p:nvSpPr>
+          <p:cNvPr id="4" name="Espace réservé du pied de page 3"/>
+          <p:cNvSpPr>
+            <a:spLocks noGrp="1"/>
+          </p:cNvSpPr>
+          <p:nvPr>
+            <p:ph type="ftr" sz="quarter" idx="11"/>
+          </p:nvPr>
+        </p:nvSpPr>
+        <p:spPr/>
+        <p:txBody>
+          <a:bodyPr/>
+          <a:lstStyle/>
+          <a:p>
+            <a:endParaRPr lang="fr-FR" dirty="0"/>
+          </a:p>
+        </p:txBody>
+      </p:sp>
+      <p:sp>
+        <p:nvSpPr>
+          <p:cNvPr id="5" name="Espace réservé du numéro de diapositive 4"/>
+          <p:cNvSpPr>
+            <a:spLocks noGrp="1"/>
+          </p:cNvSpPr>
+          <p:nvPr>
+            <p:ph type="sldNum" sz="quarter" idx="12"/>
+          </p:nvPr>
+        </p:nvSpPr>
+        <p:spPr/>
+        <p:txBody>
+          <a:bodyPr/>
+          <a:lstStyle/>
+          <a:p>
+            <a:fld id="{AF43E6FD-AB27-4108-A2FC-346BB5F75E3F}" type="slidenum">
+              <a:rPr lang="fr-FR" smtClean="0"/>
+              <a:pPr/>
+              <a:t>16</a:t>
+            </a:fld>
+            <a:endParaRPr lang="fr-FR" dirty="0"/>
+          </a:p>
+        </p:txBody>
+      </p:sp>
+      <p:pic>
+        <p:nvPicPr>
+          <p:cNvPr id="1028" name="Picture 4" descr="tldr.jpg (599×500)"/>
+          <p:cNvPicPr>
+            <a:picLocks noChangeAspect="1" noChangeArrowheads="1"/>
+          </p:cNvPicPr>
+          <p:nvPr/>
+        </p:nvPicPr>
+        <p:blipFill>
+          <a:blip r:embed="rId2">
+            <a:extLst>
+              <a:ext uri="{28A0092B-C50C-407E-A947-70E740481C1C}">
+                <a14:useLocalDpi xmlns:a14="http://schemas.microsoft.com/office/drawing/2010/main" val="0"/>
+              </a:ext>
+            </a:extLst>
+          </a:blip>
+          <a:srcRect/>
+          <a:stretch>
+            <a:fillRect/>
+          </a:stretch>
+        </p:blipFill>
+        <p:spPr bwMode="auto">
+          <a:xfrm>
+            <a:off x="1707455" y="414213"/>
+            <a:ext cx="5705475" cy="4762500"/>
+          </a:xfrm>
+          <a:prstGeom prst="rect">
+            <a:avLst/>
+          </a:prstGeom>
+          <a:noFill/>
+          <a:extLst>
+            <a:ext uri="{909E8E84-426E-40DD-AFC4-6F175D3DCCD1}">
+              <a14:hiddenFill xmlns:a14="http://schemas.microsoft.com/office/drawing/2010/main">
+                <a:solidFill>
+                  <a:srgbClr val="FFFFFF"/>
+                </a:solidFill>
+              </a14:hiddenFill>
+            </a:ext>
+          </a:extLst>
+        </p:spPr>
+      </p:pic>
+    </p:spTree>
+    <p:extLst>
+      <p:ext uri="{BB962C8B-B14F-4D97-AF65-F5344CB8AC3E}">
+        <p14:creationId xmlns:p14="http://schemas.microsoft.com/office/powerpoint/2010/main" val="2616617141"/>
+      </p:ext>
+    </p:extLst>
+  </p:cSld>
+  <p:clrMapOvr>
+    <a:masterClrMapping/>
+  </p:clrMapOvr>
+</p:sld>
+</file>
+
+<file path=ppt/slides/slide17.xml><?xml version="1.0" encoding="utf-8"?>
+<p:sld xmlns:a="http://schemas.openxmlformats.org/drawingml/2006/main" xmlns:r="http://schemas.openxmlformats.org/officeDocument/2006/relationships" xmlns:p="http://schemas.openxmlformats.org/presentationml/2006/main">
+  <p:cSld>
+    <p:spTree>
+      <p:nvGrpSpPr>
+        <p:cNvPr id="1" name=""/>
+        <p:cNvGrpSpPr/>
+        <p:nvPr/>
+      </p:nvGrpSpPr>
+      <p:grpSpPr>
+        <a:xfrm>
+          <a:off x="0" y="0"/>
+          <a:ext cx="0" cy="0"/>
+          <a:chOff x="0" y="0"/>
+          <a:chExt cx="0" cy="0"/>
+        </a:xfrm>
+      </p:grpSpPr>
+      <p:sp>
+        <p:nvSpPr>
+          <p:cNvPr id="2" name="Espace réservé du contenu 1"/>
+          <p:cNvSpPr>
+            <a:spLocks noGrp="1"/>
+          </p:cNvSpPr>
+          <p:nvPr>
+            <p:ph idx="1"/>
+          </p:nvPr>
+        </p:nvSpPr>
         <p:spPr bwMode="gray">
           <a:xfrm>
             <a:off x="515938" y="1484313"/>
@@ -14862,7 +15037,7 @@
             <a:fld id="{AF43E6FD-AB27-4108-A2FC-346BB5F75E3F}" type="slidenum">
               <a:rPr lang="fr-FR" smtClean="0"/>
               <a:pPr/>
-              <a:t>16</a:t>
+              <a:t>17</a:t>
             </a:fld>
             <a:endParaRPr lang="fr-FR" dirty="0"/>
           </a:p>
@@ -17799,9 +17974,6 @@
               </a:rPr>
               <a:t>});</a:t>
             </a:r>
-            <a:endParaRPr lang="fr-FR" sz="1600" dirty="0">
-              <a:latin typeface="Consolas" panose="020B0609020204030204" pitchFamily="49" charset="0"/>
-            </a:endParaRPr>
           </a:p>
         </p:txBody>
       </p:sp>

</xml_diff>